<commit_message>
added update password and update pin frames
</commit_message>
<xml_diff>
--- a/AZBanking presentation.pptx
+++ b/AZBanking presentation.pptx
@@ -123,6 +123,11 @@
       </a:defRPr>
     </a:lvl9pPr>
   </p:defaultTextStyle>
+  <p:extLst>
+    <p:ext uri="{EFAFB233-063F-42B5-8137-9DF3F51BA10A}">
+      <p15:sldGuideLst xmlns:p15="http://schemas.microsoft.com/office/powerpoint/2012/main"/>
+    </p:ext>
+  </p:extLst>
 </p:presentation>
 </file>
 
@@ -235,7 +240,7 @@
           <a:p>
             <a:fld id="{08500691-7A04-4831-BD70-9E3FD51A61B1}" type="datetimeFigureOut">
               <a:rPr lang="en-GB" smtClean="0"/>
-              <a:t>16/08/2021</a:t>
+              <a:t>17/08/2021</a:t>
             </a:fld>
             <a:endParaRPr lang="en-GB"/>
           </a:p>
@@ -698,7 +703,7 @@
             <a:fld id="{B61BEF0D-F0BB-DE4B-95CE-6DB70DBA9567}" type="datetimeFigureOut">
               <a:rPr lang="en-US" smtClean="0"/>
               <a:pPr/>
-              <a:t>8/16/2021</a:t>
+              <a:t>8/17/2021</a:t>
             </a:fld>
             <a:endParaRPr lang="en-US" dirty="0"/>
           </a:p>
@@ -870,7 +875,7 @@
             <a:fld id="{B61BEF0D-F0BB-DE4B-95CE-6DB70DBA9567}" type="datetimeFigureOut">
               <a:rPr lang="en-US" smtClean="0"/>
               <a:pPr/>
-              <a:t>8/16/2021</a:t>
+              <a:t>8/17/2021</a:t>
             </a:fld>
             <a:endParaRPr lang="en-US" dirty="0"/>
           </a:p>
@@ -1093,7 +1098,7 @@
             <a:fld id="{B61BEF0D-F0BB-DE4B-95CE-6DB70DBA9567}" type="datetimeFigureOut">
               <a:rPr lang="en-US" smtClean="0"/>
               <a:pPr/>
-              <a:t>8/16/2021</a:t>
+              <a:t>8/17/2021</a:t>
             </a:fld>
             <a:endParaRPr lang="en-US" dirty="0"/>
           </a:p>
@@ -1305,7 +1310,7 @@
           <a:p>
             <a:fld id="{52647F38-B617-4D2F-AE0A-013F0C4D2C57}" type="datetimeFigureOut">
               <a:rPr lang="en-US" smtClean="0"/>
-              <a:t>8/16/2021</a:t>
+              <a:t>8/17/2021</a:t>
             </a:fld>
             <a:endParaRPr lang="en-US" dirty="0"/>
           </a:p>
@@ -1601,7 +1606,7 @@
             <a:fld id="{B61BEF0D-F0BB-DE4B-95CE-6DB70DBA9567}" type="datetimeFigureOut">
               <a:rPr lang="en-US" smtClean="0"/>
               <a:pPr/>
-              <a:t>8/16/2021</a:t>
+              <a:t>8/17/2021</a:t>
             </a:fld>
             <a:endParaRPr lang="en-US" dirty="0"/>
           </a:p>
@@ -1931,7 +1936,7 @@
           <a:p>
             <a:fld id="{05BFA754-D5C3-4E66-96A6-867B257F58DC}" type="datetimeFigureOut">
               <a:rPr lang="en-US" smtClean="0"/>
-              <a:t>8/16/2021</a:t>
+              <a:t>8/17/2021</a:t>
             </a:fld>
             <a:endParaRPr lang="en-US" dirty="0"/>
           </a:p>
@@ -2424,7 +2429,7 @@
             <a:fld id="{B61BEF0D-F0BB-DE4B-95CE-6DB70DBA9567}" type="datetimeFigureOut">
               <a:rPr lang="en-US" smtClean="0"/>
               <a:pPr/>
-              <a:t>8/16/2021</a:t>
+              <a:t>8/17/2021</a:t>
             </a:fld>
             <a:endParaRPr lang="en-US" dirty="0"/>
           </a:p>
@@ -2585,7 +2590,7 @@
             <a:fld id="{B61BEF0D-F0BB-DE4B-95CE-6DB70DBA9567}" type="datetimeFigureOut">
               <a:rPr lang="en-US" smtClean="0"/>
               <a:pPr/>
-              <a:t>8/16/2021</a:t>
+              <a:t>8/17/2021</a:t>
             </a:fld>
             <a:endParaRPr lang="en-US" dirty="0"/>
           </a:p>
@@ -2723,7 +2728,7 @@
             <a:fld id="{B61BEF0D-F0BB-DE4B-95CE-6DB70DBA9567}" type="datetimeFigureOut">
               <a:rPr lang="en-US" smtClean="0"/>
               <a:pPr/>
-              <a:t>8/16/2021</a:t>
+              <a:t>8/17/2021</a:t>
             </a:fld>
             <a:endParaRPr lang="en-US" dirty="0"/>
           </a:p>
@@ -3053,7 +3058,7 @@
             <a:fld id="{B61BEF0D-F0BB-DE4B-95CE-6DB70DBA9567}" type="datetimeFigureOut">
               <a:rPr lang="en-US" smtClean="0"/>
               <a:pPr/>
-              <a:t>8/16/2021</a:t>
+              <a:t>8/17/2021</a:t>
             </a:fld>
             <a:endParaRPr lang="en-US" dirty="0"/>
           </a:p>
@@ -3370,7 +3375,7 @@
             <a:fld id="{B61BEF0D-F0BB-DE4B-95CE-6DB70DBA9567}" type="datetimeFigureOut">
               <a:rPr lang="en-US" smtClean="0"/>
               <a:pPr/>
-              <a:t>8/16/2021</a:t>
+              <a:t>8/17/2021</a:t>
             </a:fld>
             <a:endParaRPr lang="en-US" dirty="0"/>
           </a:p>
@@ -3624,7 +3629,7 @@
             <a:fld id="{B61BEF0D-F0BB-DE4B-95CE-6DB70DBA9567}" type="datetimeFigureOut">
               <a:rPr lang="en-US" smtClean="0"/>
               <a:pPr/>
-              <a:t>8/16/2021</a:t>
+              <a:t>8/17/2021</a:t>
             </a:fld>
             <a:endParaRPr lang="en-US" dirty="0"/>
           </a:p>
@@ -4175,8 +4180,8 @@
           </a:prstGeom>
         </p:spPr>
       </p:pic>
-      <mc:AlternateContent xmlns:mc="http://schemas.openxmlformats.org/markup-compatibility/2006">
-        <mc:Choice xmlns:p14="http://schemas.microsoft.com/office/powerpoint/2010/main" Requires="p14">
+      <mc:AlternateContent xmlns:mc="http://schemas.openxmlformats.org/markup-compatibility/2006" xmlns:p14="http://schemas.microsoft.com/office/powerpoint/2010/main">
+        <mc:Choice Requires="p14">
           <p:contentPart p14:bwMode="auto" r:id="rId3">
             <p14:nvContentPartPr>
               <p14:cNvPr id="6" name="Ink 5">
@@ -4195,7 +4200,7 @@
             </p14:xfrm>
           </p:contentPart>
         </mc:Choice>
-        <mc:Fallback>
+        <mc:Fallback xmlns="">
           <p:pic>
             <p:nvPicPr>
               <p:cNvPr id="6" name="Ink 5">
@@ -5082,9 +5087,9 @@
             <p:ph idx="1"/>
           </p:nvPr>
         </p:nvPicPr>
-        <p:blipFill rotWithShape="1">
+        <p:blipFill>
           <a:blip r:embed="rId2"/>
-          <a:srcRect l="3131" t="6731" r="10228" b="1362"/>
+          <a:srcRect l="5227" r="5227"/>
           <a:stretch/>
         </p:blipFill>
         <p:spPr>

</xml_diff>

<commit_message>
added type of account radio buttons
</commit_message>
<xml_diff>
--- a/AZBanking presentation.pptx
+++ b/AZBanking presentation.pptx
@@ -5,7 +5,7 @@
     <p:sldMasterId id="2147483682" r:id="rId1"/>
   </p:sldMasterIdLst>
   <p:notesMasterIdLst>
-    <p:notesMasterId r:id="rId19"/>
+    <p:notesMasterId r:id="rId21"/>
   </p:notesMasterIdLst>
   <p:sldIdLst>
     <p:sldId id="256" r:id="rId2"/>
@@ -25,6 +25,8 @@
     <p:sldId id="268" r:id="rId16"/>
     <p:sldId id="269" r:id="rId17"/>
     <p:sldId id="270" r:id="rId18"/>
+    <p:sldId id="273" r:id="rId19"/>
+    <p:sldId id="274" r:id="rId20"/>
   </p:sldIdLst>
   <p:sldSz cx="12192000" cy="6858000"/>
   <p:notesSz cx="6858000" cy="9144000"/>
@@ -4296,6 +4298,18 @@
   <p:clrMapOvr>
     <a:masterClrMapping/>
   </p:clrMapOvr>
+  <mc:AlternateContent xmlns:mc="http://schemas.openxmlformats.org/markup-compatibility/2006">
+    <mc:Choice xmlns:p14="http://schemas.microsoft.com/office/powerpoint/2010/main" Requires="p14">
+      <p:transition spd="slow" p14:dur="1500" advTm="2355">
+        <p:split orient="vert"/>
+      </p:transition>
+    </mc:Choice>
+    <mc:Fallback>
+      <p:transition spd="slow" advTm="2355">
+        <p:split orient="vert"/>
+      </p:transition>
+    </mc:Fallback>
+  </mc:AlternateContent>
 </p:sld>
 </file>
 
@@ -4459,7 +4473,7 @@
                   <a:schemeClr val="bg1"/>
                 </a:solidFill>
               </a:rPr>
-              <a:t>This is a stage where account number’s can be deleted from the bank’s database.</a:t>
+              <a:t>This is where account numbers can be deleted from the bank’s database.</a:t>
             </a:r>
           </a:p>
         </p:txBody>
@@ -4474,6 +4488,18 @@
   <p:clrMapOvr>
     <a:masterClrMapping/>
   </p:clrMapOvr>
+  <mc:AlternateContent xmlns:mc="http://schemas.openxmlformats.org/markup-compatibility/2006">
+    <mc:Choice xmlns:p14="http://schemas.microsoft.com/office/powerpoint/2010/main" Requires="p14">
+      <p:transition spd="slow" p14:dur="1500" advTm="3688">
+        <p:split orient="vert"/>
+      </p:transition>
+    </mc:Choice>
+    <mc:Fallback>
+      <p:transition spd="slow" advTm="3688">
+        <p:split orient="vert"/>
+      </p:transition>
+    </mc:Fallback>
+  </mc:AlternateContent>
 </p:sld>
 </file>
 
@@ -4617,7 +4643,7 @@
         <p:spPr>
           <a:xfrm>
             <a:off x="1202159" y="2926080"/>
-            <a:ext cx="4473526" cy="646331"/>
+            <a:ext cx="4473526" cy="923330"/>
           </a:xfrm>
           <a:prstGeom prst="rect">
             <a:avLst/>
@@ -4637,7 +4663,7 @@
                   <a:schemeClr val="bg1"/>
                 </a:solidFill>
               </a:rPr>
-              <a:t>This is a page where customer’s account can be credited with any amounts.</a:t>
+              <a:t>This is a page where a customer’s account can be credited with any amounts.</a:t>
             </a:r>
           </a:p>
         </p:txBody>
@@ -4652,6 +4678,9 @@
   <p:clrMapOvr>
     <a:masterClrMapping/>
   </p:clrMapOvr>
+  <p:transition spd="slow" advTm="3428">
+    <p:push dir="u"/>
+  </p:transition>
 </p:sld>
 </file>
 
@@ -4815,7 +4844,7 @@
                   <a:schemeClr val="bg1"/>
                 </a:solidFill>
               </a:rPr>
-              <a:t>This is a page that allows customer’s account details to be viewed on the system.</a:t>
+              <a:t>This is a page that allows a customer’s account details to be viewed on the system.</a:t>
             </a:r>
           </a:p>
         </p:txBody>
@@ -4830,6 +4859,18 @@
   <p:clrMapOvr>
     <a:masterClrMapping/>
   </p:clrMapOvr>
+  <mc:AlternateContent xmlns:mc="http://schemas.openxmlformats.org/markup-compatibility/2006">
+    <mc:Choice xmlns:p159="http://schemas.microsoft.com/office/powerpoint/2015/09/main" Requires="p159">
+      <p:transition xmlns:p14="http://schemas.microsoft.com/office/powerpoint/2010/main" spd="slow" p14:dur="2000" advTm="2932">
+        <p159:morph option="byObject"/>
+      </p:transition>
+    </mc:Choice>
+    <mc:Fallback>
+      <p:transition spd="slow" advTm="2932">
+        <p:fade/>
+      </p:transition>
+    </mc:Fallback>
+  </mc:AlternateContent>
 </p:sld>
 </file>
 
@@ -4973,7 +5014,7 @@
         <p:spPr>
           <a:xfrm>
             <a:off x="8314005" y="3677171"/>
-            <a:ext cx="2841675" cy="923330"/>
+            <a:ext cx="2841675" cy="1200329"/>
           </a:xfrm>
           <a:prstGeom prst="rect">
             <a:avLst/>
@@ -4992,7 +5033,7 @@
                   <a:schemeClr val="bg1"/>
                 </a:solidFill>
               </a:rPr>
-              <a:t>Customer’s account details can be saved and printed as a hard copy.</a:t>
+              <a:t>A customer’s account details can be downloaded and  saved to the desktop.</a:t>
             </a:r>
           </a:p>
         </p:txBody>
@@ -5007,6 +5048,9 @@
   <p:clrMapOvr>
     <a:masterClrMapping/>
   </p:clrMapOvr>
+  <p:transition spd="slow" advTm="3861">
+    <p:wipe/>
+  </p:transition>
 </p:sld>
 </file>
 
@@ -5089,7 +5133,7 @@
         </p:nvPicPr>
         <p:blipFill>
           <a:blip r:embed="rId2"/>
-          <a:srcRect l="5227" r="5227"/>
+          <a:srcRect l="5340" r="5340"/>
           <a:stretch/>
         </p:blipFill>
         <p:spPr>
@@ -5170,7 +5214,7 @@
                   <a:schemeClr val="bg1"/>
                 </a:solidFill>
               </a:rPr>
-              <a:t>This page allows customer’s to make Payments, transfers from their account numbers, Recharge their phone numbers and check their statements of account.</a:t>
+              <a:t>This page allows customers to make payments, perform transfers from their account numbers, recharge their phone numbers and check their statements of account.</a:t>
             </a:r>
           </a:p>
         </p:txBody>
@@ -5185,6 +5229,18 @@
   <p:clrMapOvr>
     <a:masterClrMapping/>
   </p:clrMapOvr>
+  <mc:AlternateContent xmlns:mc="http://schemas.openxmlformats.org/markup-compatibility/2006">
+    <mc:Choice xmlns:p14="http://schemas.microsoft.com/office/powerpoint/2010/main" Requires="p14">
+      <p:transition spd="slow" p14:dur="800" advTm="9211">
+        <p:circle/>
+      </p:transition>
+    </mc:Choice>
+    <mc:Fallback>
+      <p:transition spd="slow" advTm="9211">
+        <p:circle/>
+      </p:transition>
+    </mc:Fallback>
+  </mc:AlternateContent>
 </p:sld>
 </file>
 
@@ -5348,7 +5404,7 @@
                   <a:schemeClr val="bg1"/>
                 </a:solidFill>
               </a:rPr>
-              <a:t>This page is for airtime top-up, it accepts inputs such as the below details from the customers.</a:t>
+              <a:t>This page is for airtime top-up, it accepts inputs such as the below details from the customers:</a:t>
             </a:r>
           </a:p>
           <a:p>
@@ -5473,6 +5529,18 @@
   <p:clrMapOvr>
     <a:masterClrMapping/>
   </p:clrMapOvr>
+  <mc:AlternateContent xmlns:mc="http://schemas.openxmlformats.org/markup-compatibility/2006">
+    <mc:Choice xmlns:p14="http://schemas.microsoft.com/office/powerpoint/2010/main" Requires="p14">
+      <p:transition spd="slow" p14:dur="800" advTm="1720">
+        <p:circle/>
+      </p:transition>
+    </mc:Choice>
+    <mc:Fallback>
+      <p:transition spd="slow" advTm="1720">
+        <p:circle/>
+      </p:transition>
+    </mc:Fallback>
+  </mc:AlternateContent>
 </p:sld>
 </file>
 
@@ -5636,7 +5704,7 @@
                   <a:schemeClr val="bg1"/>
                 </a:solidFill>
               </a:rPr>
-              <a:t>Customers can pay their bills here, all that is required is just to pick the vendor, input Amount, Narration and Pin.</a:t>
+              <a:t>Customers can pay their bills here, all that is required is just to pick the vendor, input amount, narration and pin.</a:t>
             </a:r>
           </a:p>
         </p:txBody>
@@ -5651,6 +5719,9 @@
   <p:clrMapOvr>
     <a:masterClrMapping/>
   </p:clrMapOvr>
+  <p:transition spd="slow" advTm="2041">
+    <p:push dir="u"/>
+  </p:transition>
 </p:sld>
 </file>
 
@@ -5813,7 +5884,7 @@
                   <a:schemeClr val="bg1"/>
                 </a:solidFill>
               </a:rPr>
-              <a:t>The customer can transfer from his account to another account with the below inputs.</a:t>
+              <a:t>The customer can transfer from his account to another account with the following inputs:</a:t>
             </a:r>
           </a:p>
           <a:p>
@@ -5903,6 +5974,387 @@
   <p:clrMapOvr>
     <a:masterClrMapping/>
   </p:clrMapOvr>
+  <mc:AlternateContent xmlns:mc="http://schemas.openxmlformats.org/markup-compatibility/2006">
+    <mc:Choice xmlns:p14="http://schemas.microsoft.com/office/powerpoint/2010/main" Requires="p14">
+      <p:transition spd="slow" p14:dur="3400" advTm="4792">
+        <p14:reveal/>
+      </p:transition>
+    </mc:Choice>
+    <mc:Fallback>
+      <p:transition spd="slow" advTm="4792">
+        <p:fade/>
+      </p:transition>
+    </mc:Fallback>
+  </mc:AlternateContent>
+</p:sld>
+</file>
+
+<file path=ppt/slides/slide18.xml><?xml version="1.0" encoding="utf-8"?>
+<p:sld xmlns:a="http://schemas.openxmlformats.org/drawingml/2006/main" xmlns:r="http://schemas.openxmlformats.org/officeDocument/2006/relationships" xmlns:p="http://schemas.openxmlformats.org/presentationml/2006/main">
+  <p:cSld>
+    <p:bg>
+      <p:bgPr>
+        <a:solidFill>
+          <a:schemeClr val="tx1">
+            <a:lumMod val="75000"/>
+            <a:lumOff val="25000"/>
+          </a:schemeClr>
+        </a:solidFill>
+        <a:effectLst/>
+      </p:bgPr>
+    </p:bg>
+    <p:spTree>
+      <p:nvGrpSpPr>
+        <p:cNvPr id="1" name=""/>
+        <p:cNvGrpSpPr/>
+        <p:nvPr/>
+      </p:nvGrpSpPr>
+      <p:grpSpPr>
+        <a:xfrm>
+          <a:off x="0" y="0"/>
+          <a:ext cx="0" cy="0"/>
+          <a:chOff x="0" y="0"/>
+          <a:chExt cx="0" cy="0"/>
+        </a:xfrm>
+      </p:grpSpPr>
+      <p:sp>
+        <p:nvSpPr>
+          <p:cNvPr id="4" name="Title 3">
+            <a:extLst>
+              <a:ext uri="{FF2B5EF4-FFF2-40B4-BE49-F238E27FC236}">
+                <a16:creationId xmlns:a16="http://schemas.microsoft.com/office/drawing/2014/main" id="{E8917380-A267-494F-83AF-9349705D31D3}"/>
+              </a:ext>
+            </a:extLst>
+          </p:cNvPr>
+          <p:cNvSpPr>
+            <a:spLocks noGrp="1"/>
+          </p:cNvSpPr>
+          <p:nvPr>
+            <p:ph type="title"/>
+          </p:nvPr>
+        </p:nvSpPr>
+        <p:spPr>
+          <a:xfrm>
+            <a:off x="713232" y="139453"/>
+            <a:ext cx="9692640" cy="1397124"/>
+          </a:xfrm>
+        </p:spPr>
+        <p:txBody>
+          <a:bodyPr/>
+          <a:lstStyle/>
+          <a:p>
+            <a:r>
+              <a:rPr lang="en-GB" dirty="0"/>
+              <a:t>Update Password</a:t>
+            </a:r>
+          </a:p>
+        </p:txBody>
+      </p:sp>
+      <p:pic>
+        <p:nvPicPr>
+          <p:cNvPr id="7" name="Content Placeholder 6">
+            <a:extLst>
+              <a:ext uri="{FF2B5EF4-FFF2-40B4-BE49-F238E27FC236}">
+                <a16:creationId xmlns:a16="http://schemas.microsoft.com/office/drawing/2014/main" id="{7063AFFA-689B-4A74-AC6F-33CA6911D50D}"/>
+              </a:ext>
+            </a:extLst>
+          </p:cNvPr>
+          <p:cNvPicPr>
+            <a:picLocks noGrp="1" noChangeAspect="1"/>
+          </p:cNvPicPr>
+          <p:nvPr>
+            <p:ph idx="1"/>
+          </p:nvPr>
+        </p:nvPicPr>
+        <p:blipFill>
+          <a:blip r:embed="rId2"/>
+          <a:srcRect t="2272" b="2272"/>
+          <a:stretch/>
+        </p:blipFill>
+        <p:spPr>
+          <a:xfrm>
+            <a:off x="4754880" y="1744394"/>
+            <a:ext cx="6358597" cy="4847543"/>
+          </a:xfrm>
+          <a:solidFill>
+            <a:schemeClr val="tx1">
+              <a:lumMod val="75000"/>
+              <a:lumOff val="25000"/>
+            </a:schemeClr>
+          </a:solidFill>
+        </p:spPr>
+      </p:pic>
+      <p:pic>
+        <p:nvPicPr>
+          <p:cNvPr id="5" name="Picture 4">
+            <a:extLst>
+              <a:ext uri="{FF2B5EF4-FFF2-40B4-BE49-F238E27FC236}">
+                <a16:creationId xmlns:a16="http://schemas.microsoft.com/office/drawing/2014/main" id="{C3232B12-8E6B-47B7-A9E9-971CEEB5352C}"/>
+              </a:ext>
+            </a:extLst>
+          </p:cNvPr>
+          <p:cNvPicPr>
+            <a:picLocks noChangeAspect="1"/>
+          </p:cNvPicPr>
+          <p:nvPr/>
+        </p:nvPicPr>
+        <p:blipFill>
+          <a:blip r:embed="rId3"/>
+          <a:stretch>
+            <a:fillRect/>
+          </a:stretch>
+        </p:blipFill>
+        <p:spPr>
+          <a:xfrm>
+            <a:off x="9243604" y="0"/>
+            <a:ext cx="2048064" cy="901148"/>
+          </a:xfrm>
+          <a:prstGeom prst="rect">
+            <a:avLst/>
+          </a:prstGeom>
+        </p:spPr>
+      </p:pic>
+      <p:sp>
+        <p:nvSpPr>
+          <p:cNvPr id="2" name="TextBox 1">
+            <a:extLst>
+              <a:ext uri="{FF2B5EF4-FFF2-40B4-BE49-F238E27FC236}">
+                <a16:creationId xmlns:a16="http://schemas.microsoft.com/office/drawing/2014/main" id="{43CACD6C-64C0-4904-9F93-CCEAD36074A8}"/>
+              </a:ext>
+            </a:extLst>
+          </p:cNvPr>
+          <p:cNvSpPr txBox="1"/>
+          <p:nvPr/>
+        </p:nvSpPr>
+        <p:spPr>
+          <a:xfrm flipH="1">
+            <a:off x="1078523" y="2166425"/>
+            <a:ext cx="2964767" cy="923330"/>
+          </a:xfrm>
+          <a:prstGeom prst="rect">
+            <a:avLst/>
+          </a:prstGeom>
+          <a:noFill/>
+        </p:spPr>
+        <p:txBody>
+          <a:bodyPr wrap="square" rtlCol="0">
+            <a:spAutoFit/>
+          </a:bodyPr>
+          <a:lstStyle/>
+          <a:p>
+            <a:r>
+              <a:rPr lang="en-GB" dirty="0">
+                <a:solidFill>
+                  <a:schemeClr val="bg1"/>
+                </a:solidFill>
+              </a:rPr>
+              <a:t>Here, the customer can update his password in the database.</a:t>
+            </a:r>
+          </a:p>
+        </p:txBody>
+      </p:sp>
+    </p:spTree>
+    <p:extLst>
+      <p:ext uri="{BB962C8B-B14F-4D97-AF65-F5344CB8AC3E}">
+        <p14:creationId xmlns:p14="http://schemas.microsoft.com/office/powerpoint/2010/main" val="3501180479"/>
+      </p:ext>
+    </p:extLst>
+  </p:cSld>
+  <p:clrMapOvr>
+    <a:masterClrMapping/>
+  </p:clrMapOvr>
+  <mc:AlternateContent xmlns:mc="http://schemas.openxmlformats.org/markup-compatibility/2006">
+    <mc:Choice xmlns:p14="http://schemas.microsoft.com/office/powerpoint/2010/main" Requires="p14">
+      <p:transition spd="med" p14:dur="700" advTm="4792">
+        <p:fade/>
+      </p:transition>
+    </mc:Choice>
+    <mc:Fallback>
+      <p:transition spd="med" advTm="4792">
+        <p:fade/>
+      </p:transition>
+    </mc:Fallback>
+  </mc:AlternateContent>
+</p:sld>
+</file>
+
+<file path=ppt/slides/slide19.xml><?xml version="1.0" encoding="utf-8"?>
+<p:sld xmlns:a="http://schemas.openxmlformats.org/drawingml/2006/main" xmlns:r="http://schemas.openxmlformats.org/officeDocument/2006/relationships" xmlns:p="http://schemas.openxmlformats.org/presentationml/2006/main">
+  <p:cSld>
+    <p:bg>
+      <p:bgPr>
+        <a:solidFill>
+          <a:schemeClr val="tx1">
+            <a:lumMod val="75000"/>
+            <a:lumOff val="25000"/>
+          </a:schemeClr>
+        </a:solidFill>
+        <a:effectLst/>
+      </p:bgPr>
+    </p:bg>
+    <p:spTree>
+      <p:nvGrpSpPr>
+        <p:cNvPr id="1" name=""/>
+        <p:cNvGrpSpPr/>
+        <p:nvPr/>
+      </p:nvGrpSpPr>
+      <p:grpSpPr>
+        <a:xfrm>
+          <a:off x="0" y="0"/>
+          <a:ext cx="0" cy="0"/>
+          <a:chOff x="0" y="0"/>
+          <a:chExt cx="0" cy="0"/>
+        </a:xfrm>
+      </p:grpSpPr>
+      <p:sp>
+        <p:nvSpPr>
+          <p:cNvPr id="4" name="Title 3">
+            <a:extLst>
+              <a:ext uri="{FF2B5EF4-FFF2-40B4-BE49-F238E27FC236}">
+                <a16:creationId xmlns:a16="http://schemas.microsoft.com/office/drawing/2014/main" id="{E8917380-A267-494F-83AF-9349705D31D3}"/>
+              </a:ext>
+            </a:extLst>
+          </p:cNvPr>
+          <p:cNvSpPr>
+            <a:spLocks noGrp="1"/>
+          </p:cNvSpPr>
+          <p:nvPr>
+            <p:ph type="title"/>
+          </p:nvPr>
+        </p:nvSpPr>
+        <p:spPr>
+          <a:xfrm>
+            <a:off x="713232" y="139453"/>
+            <a:ext cx="9692640" cy="1397124"/>
+          </a:xfrm>
+        </p:spPr>
+        <p:txBody>
+          <a:bodyPr/>
+          <a:lstStyle/>
+          <a:p>
+            <a:r>
+              <a:rPr lang="en-GB" dirty="0"/>
+              <a:t>Update Pin</a:t>
+            </a:r>
+          </a:p>
+        </p:txBody>
+      </p:sp>
+      <p:pic>
+        <p:nvPicPr>
+          <p:cNvPr id="7" name="Content Placeholder 6">
+            <a:extLst>
+              <a:ext uri="{FF2B5EF4-FFF2-40B4-BE49-F238E27FC236}">
+                <a16:creationId xmlns:a16="http://schemas.microsoft.com/office/drawing/2014/main" id="{7063AFFA-689B-4A74-AC6F-33CA6911D50D}"/>
+              </a:ext>
+            </a:extLst>
+          </p:cNvPr>
+          <p:cNvPicPr>
+            <a:picLocks noGrp="1" noChangeAspect="1"/>
+          </p:cNvPicPr>
+          <p:nvPr>
+            <p:ph idx="1"/>
+          </p:nvPr>
+        </p:nvPicPr>
+        <p:blipFill>
+          <a:blip r:embed="rId2"/>
+          <a:srcRect t="2492" b="2492"/>
+          <a:stretch/>
+        </p:blipFill>
+        <p:spPr>
+          <a:xfrm>
+            <a:off x="4754880" y="1744394"/>
+            <a:ext cx="6358597" cy="4847543"/>
+          </a:xfrm>
+          <a:solidFill>
+            <a:schemeClr val="tx1">
+              <a:lumMod val="75000"/>
+              <a:lumOff val="25000"/>
+            </a:schemeClr>
+          </a:solidFill>
+        </p:spPr>
+      </p:pic>
+      <p:pic>
+        <p:nvPicPr>
+          <p:cNvPr id="5" name="Picture 4">
+            <a:extLst>
+              <a:ext uri="{FF2B5EF4-FFF2-40B4-BE49-F238E27FC236}">
+                <a16:creationId xmlns:a16="http://schemas.microsoft.com/office/drawing/2014/main" id="{C3232B12-8E6B-47B7-A9E9-971CEEB5352C}"/>
+              </a:ext>
+            </a:extLst>
+          </p:cNvPr>
+          <p:cNvPicPr>
+            <a:picLocks noChangeAspect="1"/>
+          </p:cNvPicPr>
+          <p:nvPr/>
+        </p:nvPicPr>
+        <p:blipFill>
+          <a:blip r:embed="rId3"/>
+          <a:stretch>
+            <a:fillRect/>
+          </a:stretch>
+        </p:blipFill>
+        <p:spPr>
+          <a:xfrm>
+            <a:off x="9243604" y="0"/>
+            <a:ext cx="2048064" cy="901148"/>
+          </a:xfrm>
+          <a:prstGeom prst="rect">
+            <a:avLst/>
+          </a:prstGeom>
+        </p:spPr>
+      </p:pic>
+      <p:sp>
+        <p:nvSpPr>
+          <p:cNvPr id="2" name="TextBox 1">
+            <a:extLst>
+              <a:ext uri="{FF2B5EF4-FFF2-40B4-BE49-F238E27FC236}">
+                <a16:creationId xmlns:a16="http://schemas.microsoft.com/office/drawing/2014/main" id="{43CACD6C-64C0-4904-9F93-CCEAD36074A8}"/>
+              </a:ext>
+            </a:extLst>
+          </p:cNvPr>
+          <p:cNvSpPr txBox="1"/>
+          <p:nvPr/>
+        </p:nvSpPr>
+        <p:spPr>
+          <a:xfrm flipH="1">
+            <a:off x="1078523" y="2166425"/>
+            <a:ext cx="2964767" cy="923330"/>
+          </a:xfrm>
+          <a:prstGeom prst="rect">
+            <a:avLst/>
+          </a:prstGeom>
+          <a:noFill/>
+        </p:spPr>
+        <p:txBody>
+          <a:bodyPr wrap="square" rtlCol="0">
+            <a:spAutoFit/>
+          </a:bodyPr>
+          <a:lstStyle/>
+          <a:p>
+            <a:r>
+              <a:rPr lang="en-GB" dirty="0">
+                <a:solidFill>
+                  <a:schemeClr val="bg1"/>
+                </a:solidFill>
+              </a:rPr>
+              <a:t>Here, the customer can update his pin in the database.</a:t>
+            </a:r>
+          </a:p>
+        </p:txBody>
+      </p:sp>
+    </p:spTree>
+    <p:extLst>
+      <p:ext uri="{BB962C8B-B14F-4D97-AF65-F5344CB8AC3E}">
+        <p14:creationId xmlns:p14="http://schemas.microsoft.com/office/powerpoint/2010/main" val="1243869660"/>
+      </p:ext>
+    </p:extLst>
+  </p:cSld>
+  <p:clrMapOvr>
+    <a:masterClrMapping/>
+  </p:clrMapOvr>
+  <p:transition spd="slow" advTm="4792">
+    <p:comb/>
+  </p:transition>
 </p:sld>
 </file>
 
@@ -6066,7 +6518,7 @@
                   <a:schemeClr val="bg1"/>
                 </a:solidFill>
               </a:rPr>
-              <a:t>This page comes up when the app is launched, it allows both customer’s and staffs of the bank use the features within.</a:t>
+              <a:t>This page comes up when the app is launched, it allows both customers and staffs of the bank to use the features within.</a:t>
             </a:r>
           </a:p>
         </p:txBody>
@@ -6081,6 +6533,18 @@
   <p:clrMapOvr>
     <a:masterClrMapping/>
   </p:clrMapOvr>
+  <mc:AlternateContent xmlns:mc="http://schemas.openxmlformats.org/markup-compatibility/2006">
+    <mc:Choice xmlns:p14="http://schemas.microsoft.com/office/powerpoint/2010/main" Requires="p14">
+      <p:transition spd="slow" p14:dur="800" advTm="2965">
+        <p:circle/>
+      </p:transition>
+    </mc:Choice>
+    <mc:Fallback>
+      <p:transition spd="slow" advTm="2965">
+        <p:circle/>
+      </p:transition>
+    </mc:Fallback>
+  </mc:AlternateContent>
 </p:sld>
 </file>
 
@@ -6299,6 +6763,18 @@
   <p:clrMapOvr>
     <a:masterClrMapping/>
   </p:clrMapOvr>
+  <mc:AlternateContent xmlns:mc="http://schemas.openxmlformats.org/markup-compatibility/2006">
+    <mc:Choice xmlns:p14="http://schemas.microsoft.com/office/powerpoint/2010/main" Requires="p14">
+      <p:transition spd="slow" p14:dur="1500" advTm="1717">
+        <p:split orient="vert"/>
+      </p:transition>
+    </mc:Choice>
+    <mc:Fallback>
+      <p:transition spd="slow" advTm="1717">
+        <p:split orient="vert"/>
+      </p:transition>
+    </mc:Fallback>
+  </mc:AlternateContent>
 </p:sld>
 </file>
 
@@ -6477,6 +6953,18 @@
   <p:clrMapOvr>
     <a:masterClrMapping/>
   </p:clrMapOvr>
+  <mc:AlternateContent xmlns:mc="http://schemas.openxmlformats.org/markup-compatibility/2006">
+    <mc:Choice xmlns:p14="http://schemas.microsoft.com/office/powerpoint/2010/main" Requires="p14">
+      <p:transition spd="slow" p14:dur="800" advTm="1681">
+        <p:circle/>
+      </p:transition>
+    </mc:Choice>
+    <mc:Fallback>
+      <p:transition spd="slow" advTm="1681">
+        <p:circle/>
+      </p:transition>
+    </mc:Fallback>
+  </mc:AlternateContent>
 </p:sld>
 </file>
 
@@ -6654,6 +7142,18 @@
   <p:clrMapOvr>
     <a:masterClrMapping/>
   </p:clrMapOvr>
+  <mc:AlternateContent xmlns:mc="http://schemas.openxmlformats.org/markup-compatibility/2006">
+    <mc:Choice xmlns:p14="http://schemas.microsoft.com/office/powerpoint/2010/main" Requires="p14">
+      <p:transition spd="med" p14:dur="700" advTm="1583">
+        <p:fade/>
+      </p:transition>
+    </mc:Choice>
+    <mc:Fallback>
+      <p:transition spd="med" advTm="1583">
+        <p:fade/>
+      </p:transition>
+    </mc:Fallback>
+  </mc:AlternateContent>
 </p:sld>
 </file>
 
@@ -6829,7 +7329,7 @@
                   <a:schemeClr val="bg1"/>
                 </a:solidFill>
               </a:rPr>
-              <a:t>The customer can input their account numbers, Password and Pin which will be used for transactional processes.</a:t>
+              <a:t>The customer can input their account numbers, password and pin which will be used for transactional processes.</a:t>
             </a:r>
           </a:p>
         </p:txBody>
@@ -6844,6 +7344,18 @@
   <p:clrMapOvr>
     <a:masterClrMapping/>
   </p:clrMapOvr>
+  <mc:AlternateContent xmlns:mc="http://schemas.openxmlformats.org/markup-compatibility/2006">
+    <mc:Choice xmlns:p14="http://schemas.microsoft.com/office/powerpoint/2010/main" Requires="p14">
+      <p:transition spd="slow" p14:dur="3400" advTm="1790">
+        <p14:reveal/>
+      </p:transition>
+    </mc:Choice>
+    <mc:Fallback>
+      <p:transition spd="slow" advTm="1790">
+        <p:fade/>
+      </p:transition>
+    </mc:Fallback>
+  </mc:AlternateContent>
 </p:sld>
 </file>
 
@@ -7019,7 +7531,7 @@
                   <a:schemeClr val="bg1"/>
                 </a:solidFill>
               </a:rPr>
-              <a:t>This is a page where the employee of the bank can login with their username and Password and perform their daily transactions.</a:t>
+              <a:t>This is a page where the employee of the bank can login with their username and password and perform their daily transactions.</a:t>
             </a:r>
           </a:p>
         </p:txBody>
@@ -7034,6 +7546,14 @@
   <p:clrMapOvr>
     <a:masterClrMapping/>
   </p:clrMapOvr>
+  <mc:AlternateContent xmlns:mc="http://schemas.openxmlformats.org/markup-compatibility/2006">
+    <mc:Choice xmlns:p14="http://schemas.microsoft.com/office/powerpoint/2010/main" Requires="p14">
+      <p:transition spd="slow" p14:dur="2000" advTm="2809"/>
+    </mc:Choice>
+    <mc:Fallback>
+      <p:transition spd="slow" advTm="2809"/>
+    </mc:Fallback>
+  </mc:AlternateContent>
 </p:sld>
 </file>
 
@@ -7298,6 +7818,9 @@
   <p:clrMapOvr>
     <a:masterClrMapping/>
   </p:clrMapOvr>
+  <p:transition spd="slow" advTm="1941">
+    <p:wipe/>
+  </p:transition>
 </p:sld>
 </file>
 
@@ -7378,21 +7901,9 @@
             <p:ph idx="1"/>
           </p:nvPr>
         </p:nvPicPr>
-        <p:blipFill rotWithShape="1">
-          <a:blip r:embed="rId2">
-            <a:extLst>
-              <a:ext uri="{BEBA8EAE-BF5A-486C-A8C5-ECC9F3942E4B}">
-                <a14:imgProps xmlns:a14="http://schemas.microsoft.com/office/drawing/2010/main">
-                  <a14:imgLayer r:embed="rId3">
-                    <a14:imgEffect>
-                      <a14:sharpenSoften amount="25000"/>
-                    </a14:imgEffect>
-                  </a14:imgLayer>
-                </a14:imgProps>
-              </a:ext>
-            </a:extLst>
-          </a:blip>
-          <a:srcRect l="11563" t="6052" r="11563"/>
+        <p:blipFill>
+          <a:blip r:embed="rId2"/>
+          <a:srcRect l="11643" r="11643"/>
           <a:stretch/>
         </p:blipFill>
         <p:spPr>
@@ -7423,7 +7934,7 @@
           <p:nvPr/>
         </p:nvPicPr>
         <p:blipFill>
-          <a:blip r:embed="rId4"/>
+          <a:blip r:embed="rId3"/>
           <a:stretch>
             <a:fillRect/>
           </a:stretch>
@@ -7473,7 +7984,7 @@
                   <a:schemeClr val="bg1"/>
                 </a:solidFill>
               </a:rPr>
-              <a:t>The account creation section is for setting up customer’s account, with the inputs below:</a:t>
+              <a:t>The account creation section is for setting up a customer’s account, with the inputs below:</a:t>
             </a:r>
           </a:p>
           <a:p>
@@ -7614,6 +8125,9 @@
   <p:clrMapOvr>
     <a:masterClrMapping/>
   </p:clrMapOvr>
+  <p:transition spd="slow" advTm="4432">
+    <p:randomBar dir="vert"/>
+  </p:transition>
 </p:sld>
 </file>
 

</xml_diff>

<commit_message>
modified the terms and conditions
</commit_message>
<xml_diff>
--- a/AZBanking presentation.pptx
+++ b/AZBanking presentation.pptx
@@ -242,7 +242,7 @@
           <a:p>
             <a:fld id="{08500691-7A04-4831-BD70-9E3FD51A61B1}" type="datetimeFigureOut">
               <a:rPr lang="en-GB" smtClean="0"/>
-              <a:t>17/08/2021</a:t>
+              <a:t>18/08/2021</a:t>
             </a:fld>
             <a:endParaRPr lang="en-GB"/>
           </a:p>
@@ -705,7 +705,7 @@
             <a:fld id="{B61BEF0D-F0BB-DE4B-95CE-6DB70DBA9567}" type="datetimeFigureOut">
               <a:rPr lang="en-US" smtClean="0"/>
               <a:pPr/>
-              <a:t>8/17/2021</a:t>
+              <a:t>8/18/2021</a:t>
             </a:fld>
             <a:endParaRPr lang="en-US" dirty="0"/>
           </a:p>
@@ -877,7 +877,7 @@
             <a:fld id="{B61BEF0D-F0BB-DE4B-95CE-6DB70DBA9567}" type="datetimeFigureOut">
               <a:rPr lang="en-US" smtClean="0"/>
               <a:pPr/>
-              <a:t>8/17/2021</a:t>
+              <a:t>8/18/2021</a:t>
             </a:fld>
             <a:endParaRPr lang="en-US" dirty="0"/>
           </a:p>
@@ -1100,7 +1100,7 @@
             <a:fld id="{B61BEF0D-F0BB-DE4B-95CE-6DB70DBA9567}" type="datetimeFigureOut">
               <a:rPr lang="en-US" smtClean="0"/>
               <a:pPr/>
-              <a:t>8/17/2021</a:t>
+              <a:t>8/18/2021</a:t>
             </a:fld>
             <a:endParaRPr lang="en-US" dirty="0"/>
           </a:p>
@@ -1312,7 +1312,7 @@
           <a:p>
             <a:fld id="{52647F38-B617-4D2F-AE0A-013F0C4D2C57}" type="datetimeFigureOut">
               <a:rPr lang="en-US" smtClean="0"/>
-              <a:t>8/17/2021</a:t>
+              <a:t>8/18/2021</a:t>
             </a:fld>
             <a:endParaRPr lang="en-US" dirty="0"/>
           </a:p>
@@ -1608,7 +1608,7 @@
             <a:fld id="{B61BEF0D-F0BB-DE4B-95CE-6DB70DBA9567}" type="datetimeFigureOut">
               <a:rPr lang="en-US" smtClean="0"/>
               <a:pPr/>
-              <a:t>8/17/2021</a:t>
+              <a:t>8/18/2021</a:t>
             </a:fld>
             <a:endParaRPr lang="en-US" dirty="0"/>
           </a:p>
@@ -1938,7 +1938,7 @@
           <a:p>
             <a:fld id="{05BFA754-D5C3-4E66-96A6-867B257F58DC}" type="datetimeFigureOut">
               <a:rPr lang="en-US" smtClean="0"/>
-              <a:t>8/17/2021</a:t>
+              <a:t>8/18/2021</a:t>
             </a:fld>
             <a:endParaRPr lang="en-US" dirty="0"/>
           </a:p>
@@ -2431,7 +2431,7 @@
             <a:fld id="{B61BEF0D-F0BB-DE4B-95CE-6DB70DBA9567}" type="datetimeFigureOut">
               <a:rPr lang="en-US" smtClean="0"/>
               <a:pPr/>
-              <a:t>8/17/2021</a:t>
+              <a:t>8/18/2021</a:t>
             </a:fld>
             <a:endParaRPr lang="en-US" dirty="0"/>
           </a:p>
@@ -2592,7 +2592,7 @@
             <a:fld id="{B61BEF0D-F0BB-DE4B-95CE-6DB70DBA9567}" type="datetimeFigureOut">
               <a:rPr lang="en-US" smtClean="0"/>
               <a:pPr/>
-              <a:t>8/17/2021</a:t>
+              <a:t>8/18/2021</a:t>
             </a:fld>
             <a:endParaRPr lang="en-US" dirty="0"/>
           </a:p>
@@ -2730,7 +2730,7 @@
             <a:fld id="{B61BEF0D-F0BB-DE4B-95CE-6DB70DBA9567}" type="datetimeFigureOut">
               <a:rPr lang="en-US" smtClean="0"/>
               <a:pPr/>
-              <a:t>8/17/2021</a:t>
+              <a:t>8/18/2021</a:t>
             </a:fld>
             <a:endParaRPr lang="en-US" dirty="0"/>
           </a:p>
@@ -3060,7 +3060,7 @@
             <a:fld id="{B61BEF0D-F0BB-DE4B-95CE-6DB70DBA9567}" type="datetimeFigureOut">
               <a:rPr lang="en-US" smtClean="0"/>
               <a:pPr/>
-              <a:t>8/17/2021</a:t>
+              <a:t>8/18/2021</a:t>
             </a:fld>
             <a:endParaRPr lang="en-US" dirty="0"/>
           </a:p>
@@ -3377,7 +3377,7 @@
             <a:fld id="{B61BEF0D-F0BB-DE4B-95CE-6DB70DBA9567}" type="datetimeFigureOut">
               <a:rPr lang="en-US" smtClean="0"/>
               <a:pPr/>
-              <a:t>8/17/2021</a:t>
+              <a:t>8/18/2021</a:t>
             </a:fld>
             <a:endParaRPr lang="en-US" dirty="0"/>
           </a:p>
@@ -3631,7 +3631,7 @@
             <a:fld id="{B61BEF0D-F0BB-DE4B-95CE-6DB70DBA9567}" type="datetimeFigureOut">
               <a:rPr lang="en-US" smtClean="0"/>
               <a:pPr/>
-              <a:t>8/17/2021</a:t>
+              <a:t>8/18/2021</a:t>
             </a:fld>
             <a:endParaRPr lang="en-US" dirty="0"/>
           </a:p>
@@ -4298,13 +4298,13 @@
   <p:clrMapOvr>
     <a:masterClrMapping/>
   </p:clrMapOvr>
-  <mc:AlternateContent xmlns:mc="http://schemas.openxmlformats.org/markup-compatibility/2006">
-    <mc:Choice xmlns:p14="http://schemas.microsoft.com/office/powerpoint/2010/main" Requires="p14">
+  <mc:AlternateContent xmlns:mc="http://schemas.openxmlformats.org/markup-compatibility/2006" xmlns:p14="http://schemas.microsoft.com/office/powerpoint/2010/main">
+    <mc:Choice Requires="p14">
       <p:transition spd="slow" p14:dur="1500" advTm="2355">
         <p:split orient="vert"/>
       </p:transition>
     </mc:Choice>
-    <mc:Fallback>
+    <mc:Fallback xmlns="">
       <p:transition spd="slow" advTm="2355">
         <p:split orient="vert"/>
       </p:transition>
@@ -4488,13 +4488,13 @@
   <p:clrMapOvr>
     <a:masterClrMapping/>
   </p:clrMapOvr>
-  <mc:AlternateContent xmlns:mc="http://schemas.openxmlformats.org/markup-compatibility/2006">
-    <mc:Choice xmlns:p14="http://schemas.microsoft.com/office/powerpoint/2010/main" Requires="p14">
+  <mc:AlternateContent xmlns:mc="http://schemas.openxmlformats.org/markup-compatibility/2006" xmlns:p14="http://schemas.microsoft.com/office/powerpoint/2010/main">
+    <mc:Choice Requires="p14">
       <p:transition spd="slow" p14:dur="1500" advTm="3688">
         <p:split orient="vert"/>
       </p:transition>
     </mc:Choice>
-    <mc:Fallback>
+    <mc:Fallback xmlns="">
       <p:transition spd="slow" advTm="3688">
         <p:split orient="vert"/>
       </p:transition>
@@ -4859,13 +4859,13 @@
   <p:clrMapOvr>
     <a:masterClrMapping/>
   </p:clrMapOvr>
-  <mc:AlternateContent xmlns:mc="http://schemas.openxmlformats.org/markup-compatibility/2006">
-    <mc:Choice xmlns:p159="http://schemas.microsoft.com/office/powerpoint/2015/09/main" Requires="p159">
+  <mc:AlternateContent xmlns:mc="http://schemas.openxmlformats.org/markup-compatibility/2006" xmlns:p159="http://schemas.microsoft.com/office/powerpoint/2015/09/main">
+    <mc:Choice Requires="p159">
       <p:transition xmlns:p14="http://schemas.microsoft.com/office/powerpoint/2010/main" spd="slow" p14:dur="2000" advTm="2932">
         <p159:morph option="byObject"/>
       </p:transition>
     </mc:Choice>
-    <mc:Fallback>
+    <mc:Fallback xmlns="">
       <p:transition spd="slow" advTm="2932">
         <p:fade/>
       </p:transition>
@@ -5339,13 +5339,13 @@
   <p:clrMapOvr>
     <a:masterClrMapping/>
   </p:clrMapOvr>
-  <mc:AlternateContent xmlns:mc="http://schemas.openxmlformats.org/markup-compatibility/2006">
-    <mc:Choice xmlns:p14="http://schemas.microsoft.com/office/powerpoint/2010/main" Requires="p14">
+  <mc:AlternateContent xmlns:mc="http://schemas.openxmlformats.org/markup-compatibility/2006" xmlns:p14="http://schemas.microsoft.com/office/powerpoint/2010/main">
+    <mc:Choice Requires="p14">
       <p:transition spd="slow" p14:dur="800" advTm="9211">
         <p:circle/>
       </p:transition>
     </mc:Choice>
-    <mc:Fallback>
+    <mc:Fallback xmlns="">
       <p:transition spd="slow" advTm="9211">
         <p:circle/>
       </p:transition>
@@ -5639,13 +5639,13 @@
   <p:clrMapOvr>
     <a:masterClrMapping/>
   </p:clrMapOvr>
-  <mc:AlternateContent xmlns:mc="http://schemas.openxmlformats.org/markup-compatibility/2006">
-    <mc:Choice xmlns:p14="http://schemas.microsoft.com/office/powerpoint/2010/main" Requires="p14">
+  <mc:AlternateContent xmlns:mc="http://schemas.openxmlformats.org/markup-compatibility/2006" xmlns:p14="http://schemas.microsoft.com/office/powerpoint/2010/main">
+    <mc:Choice Requires="p14">
       <p:transition spd="slow" p14:dur="800" advTm="1720">
         <p:circle/>
       </p:transition>
     </mc:Choice>
-    <mc:Fallback>
+    <mc:Fallback xmlns="">
       <p:transition spd="slow" advTm="1720">
         <p:circle/>
       </p:transition>
@@ -6084,13 +6084,13 @@
   <p:clrMapOvr>
     <a:masterClrMapping/>
   </p:clrMapOvr>
-  <mc:AlternateContent xmlns:mc="http://schemas.openxmlformats.org/markup-compatibility/2006">
-    <mc:Choice xmlns:p14="http://schemas.microsoft.com/office/powerpoint/2010/main" Requires="p14">
+  <mc:AlternateContent xmlns:mc="http://schemas.openxmlformats.org/markup-compatibility/2006" xmlns:p14="http://schemas.microsoft.com/office/powerpoint/2010/main">
+    <mc:Choice Requires="p14">
       <p:transition spd="slow" p14:dur="3400" advTm="4792">
         <p14:reveal/>
       </p:transition>
     </mc:Choice>
-    <mc:Fallback>
+    <mc:Fallback xmlns="">
       <p:transition spd="slow" advTm="4792">
         <p:fade/>
       </p:transition>
@@ -6273,13 +6273,13 @@
   <p:clrMapOvr>
     <a:masterClrMapping/>
   </p:clrMapOvr>
-  <mc:AlternateContent xmlns:mc="http://schemas.openxmlformats.org/markup-compatibility/2006">
-    <mc:Choice xmlns:p14="http://schemas.microsoft.com/office/powerpoint/2010/main" Requires="p14">
+  <mc:AlternateContent xmlns:mc="http://schemas.openxmlformats.org/markup-compatibility/2006" xmlns:p14="http://schemas.microsoft.com/office/powerpoint/2010/main">
+    <mc:Choice Requires="p14">
       <p:transition spd="med" p14:dur="700" advTm="4792">
         <p:fade/>
       </p:transition>
     </mc:Choice>
-    <mc:Fallback>
+    <mc:Fallback xmlns="">
       <p:transition spd="med" advTm="4792">
         <p:fade/>
       </p:transition>
@@ -6643,13 +6643,13 @@
   <p:clrMapOvr>
     <a:masterClrMapping/>
   </p:clrMapOvr>
-  <mc:AlternateContent xmlns:mc="http://schemas.openxmlformats.org/markup-compatibility/2006">
-    <mc:Choice xmlns:p14="http://schemas.microsoft.com/office/powerpoint/2010/main" Requires="p14">
+  <mc:AlternateContent xmlns:mc="http://schemas.openxmlformats.org/markup-compatibility/2006" xmlns:p14="http://schemas.microsoft.com/office/powerpoint/2010/main">
+    <mc:Choice Requires="p14">
       <p:transition spd="slow" p14:dur="800" advTm="2965">
         <p:circle/>
       </p:transition>
     </mc:Choice>
-    <mc:Fallback>
+    <mc:Fallback xmlns="">
       <p:transition spd="slow" advTm="2965">
         <p:circle/>
       </p:transition>
@@ -6873,13 +6873,13 @@
   <p:clrMapOvr>
     <a:masterClrMapping/>
   </p:clrMapOvr>
-  <mc:AlternateContent xmlns:mc="http://schemas.openxmlformats.org/markup-compatibility/2006">
-    <mc:Choice xmlns:p14="http://schemas.microsoft.com/office/powerpoint/2010/main" Requires="p14">
+  <mc:AlternateContent xmlns:mc="http://schemas.openxmlformats.org/markup-compatibility/2006" xmlns:p14="http://schemas.microsoft.com/office/powerpoint/2010/main">
+    <mc:Choice Requires="p14">
       <p:transition spd="slow" p14:dur="1500" advTm="1717">
         <p:split orient="vert"/>
       </p:transition>
     </mc:Choice>
-    <mc:Fallback>
+    <mc:Fallback xmlns="">
       <p:transition spd="slow" advTm="1717">
         <p:split orient="vert"/>
       </p:transition>
@@ -7063,13 +7063,13 @@
   <p:clrMapOvr>
     <a:masterClrMapping/>
   </p:clrMapOvr>
-  <mc:AlternateContent xmlns:mc="http://schemas.openxmlformats.org/markup-compatibility/2006">
-    <mc:Choice xmlns:p14="http://schemas.microsoft.com/office/powerpoint/2010/main" Requires="p14">
+  <mc:AlternateContent xmlns:mc="http://schemas.openxmlformats.org/markup-compatibility/2006" xmlns:p14="http://schemas.microsoft.com/office/powerpoint/2010/main">
+    <mc:Choice Requires="p14">
       <p:transition spd="slow" p14:dur="800" advTm="1681">
         <p:circle/>
       </p:transition>
     </mc:Choice>
-    <mc:Fallback>
+    <mc:Fallback xmlns="">
       <p:transition spd="slow" advTm="1681">
         <p:circle/>
       </p:transition>
@@ -7155,9 +7155,9 @@
             <p:ph idx="1"/>
           </p:nvPr>
         </p:nvPicPr>
-        <p:blipFill rotWithShape="1">
+        <p:blipFill>
           <a:blip r:embed="rId2"/>
-          <a:srcRect l="8324" t="4693" r="8324"/>
+          <a:srcRect l="7926" r="7926"/>
           <a:stretch/>
         </p:blipFill>
         <p:spPr>
@@ -7252,13 +7252,13 @@
   <p:clrMapOvr>
     <a:masterClrMapping/>
   </p:clrMapOvr>
-  <mc:AlternateContent xmlns:mc="http://schemas.openxmlformats.org/markup-compatibility/2006">
-    <mc:Choice xmlns:p14="http://schemas.microsoft.com/office/powerpoint/2010/main" Requires="p14">
+  <mc:AlternateContent xmlns:mc="http://schemas.openxmlformats.org/markup-compatibility/2006" xmlns:p14="http://schemas.microsoft.com/office/powerpoint/2010/main">
+    <mc:Choice Requires="p14">
       <p:transition spd="med" p14:dur="700" advTm="1583">
         <p:fade/>
       </p:transition>
     </mc:Choice>
-    <mc:Fallback>
+    <mc:Fallback xmlns="">
       <p:transition spd="med" advTm="1583">
         <p:fade/>
       </p:transition>
@@ -7454,13 +7454,13 @@
   <p:clrMapOvr>
     <a:masterClrMapping/>
   </p:clrMapOvr>
-  <mc:AlternateContent xmlns:mc="http://schemas.openxmlformats.org/markup-compatibility/2006">
-    <mc:Choice xmlns:p14="http://schemas.microsoft.com/office/powerpoint/2010/main" Requires="p14">
+  <mc:AlternateContent xmlns:mc="http://schemas.openxmlformats.org/markup-compatibility/2006" xmlns:p14="http://schemas.microsoft.com/office/powerpoint/2010/main">
+    <mc:Choice Requires="p14">
       <p:transition spd="slow" p14:dur="3400" advTm="1790">
         <p14:reveal/>
       </p:transition>
     </mc:Choice>
-    <mc:Fallback>
+    <mc:Fallback xmlns="">
       <p:transition spd="slow" advTm="1790">
         <p:fade/>
       </p:transition>
@@ -7656,11 +7656,11 @@
   <p:clrMapOvr>
     <a:masterClrMapping/>
   </p:clrMapOvr>
-  <mc:AlternateContent xmlns:mc="http://schemas.openxmlformats.org/markup-compatibility/2006">
-    <mc:Choice xmlns:p14="http://schemas.microsoft.com/office/powerpoint/2010/main" Requires="p14">
+  <mc:AlternateContent xmlns:mc="http://schemas.openxmlformats.org/markup-compatibility/2006" xmlns:p14="http://schemas.microsoft.com/office/powerpoint/2010/main">
+    <mc:Choice Requires="p14">
       <p:transition spd="slow" p14:dur="2000" advTm="2809"/>
     </mc:Choice>
-    <mc:Fallback>
+    <mc:Fallback xmlns="">
       <p:transition spd="slow" advTm="2809"/>
     </mc:Fallback>
   </mc:AlternateContent>

</xml_diff>